<commit_message>
new readme, updated docs (incl. Final Report), updated ppt slide
</commit_message>
<xml_diff>
--- a/documents/PRESENTATION/G08_PRESENTATION_WDGP.pptx
+++ b/documents/PRESENTATION/G08_PRESENTATION_WDGP.pptx
@@ -5229,11 +5229,14 @@
         <p:spPr/>
         <p:txBody>
           <a:bodyPr>
-            <a:normAutofit lnSpcReduction="10000"/>
+            <a:normAutofit/>
           </a:bodyPr>
           <a:lstStyle/>
           <a:p>
             <a:pPr>
+              <a:lnSpc>
+                <a:spcPct val="150000"/>
+              </a:lnSpc>
               <a:buFontTx/>
               <a:buChar char="-"/>
             </a:pPr>
@@ -5280,6 +5283,9 @@
           </a:p>
           <a:p>
             <a:pPr marL="0" indent="0">
+              <a:lnSpc>
+                <a:spcPct val="150000"/>
+              </a:lnSpc>
               <a:buNone/>
             </a:pPr>
             <a:r>
@@ -5377,6 +5383,9 @@
           </a:p>
           <a:p>
             <a:pPr marL="0" indent="0">
+              <a:lnSpc>
+                <a:spcPct val="150000"/>
+              </a:lnSpc>
               <a:buNone/>
             </a:pPr>
             <a:r>
@@ -5466,6 +5475,9 @@
           </a:p>
           <a:p>
             <a:pPr marL="0" indent="0">
+              <a:lnSpc>
+                <a:spcPct val="150000"/>
+              </a:lnSpc>
               <a:buNone/>
             </a:pPr>
             <a:r>
@@ -5555,6 +5567,9 @@
           </a:p>
           <a:p>
             <a:pPr>
+              <a:lnSpc>
+                <a:spcPct val="150000"/>
+              </a:lnSpc>
               <a:buFontTx/>
               <a:buChar char="-"/>
             </a:pPr>
@@ -5617,6 +5632,9 @@
           </a:p>
           <a:p>
             <a:pPr marL="0" indent="0">
+              <a:lnSpc>
+                <a:spcPct val="150000"/>
+              </a:lnSpc>
               <a:buNone/>
             </a:pPr>
             <a:r>
@@ -5650,6 +5668,9 @@
           </a:p>
           <a:p>
             <a:pPr marL="0" indent="0">
+              <a:lnSpc>
+                <a:spcPct val="150000"/>
+              </a:lnSpc>
               <a:buNone/>
             </a:pPr>
             <a:r>
@@ -5693,102 +5714,6 @@
               <a:t>thể trong khả năng cho phép.</a:t>
             </a:r>
             <a:endParaRPr lang="en-US" dirty="0"/>
-          </a:p>
-          <a:p>
-            <a:pPr>
-              <a:buFontTx/>
-              <a:buChar char="-"/>
-            </a:pPr>
-            <a:r>
-              <a:rPr lang="en-US" dirty="0" err="1"/>
-              <a:t>Thời</a:t>
-            </a:r>
-            <a:r>
-              <a:rPr lang="en-US" dirty="0"/>
-              <a:t> </a:t>
-            </a:r>
-            <a:r>
-              <a:rPr lang="en-US" dirty="0" err="1"/>
-              <a:t>gian</a:t>
-            </a:r>
-            <a:r>
-              <a:rPr lang="en-US" dirty="0"/>
-              <a:t> </a:t>
-            </a:r>
-            <a:r>
-              <a:rPr lang="en-US" dirty="0" err="1"/>
-              <a:t>thực</a:t>
-            </a:r>
-            <a:r>
-              <a:rPr lang="en-US" dirty="0"/>
-              <a:t> </a:t>
-            </a:r>
-            <a:r>
-              <a:rPr lang="en-US" dirty="0" err="1"/>
-              <a:t>hiện</a:t>
-            </a:r>
-            <a:r>
-              <a:rPr lang="en-US" dirty="0"/>
-              <a:t> </a:t>
-            </a:r>
-            <a:r>
-              <a:rPr lang="en-US" dirty="0" err="1"/>
-              <a:t>sản</a:t>
-            </a:r>
-            <a:r>
-              <a:rPr lang="en-US" dirty="0"/>
-              <a:t> </a:t>
-            </a:r>
-            <a:r>
-              <a:rPr lang="en-US" dirty="0" err="1"/>
-              <a:t>phẩm</a:t>
-            </a:r>
-            <a:r>
-              <a:rPr lang="en-US" dirty="0"/>
-              <a:t> </a:t>
-            </a:r>
-            <a:r>
-              <a:rPr lang="en-US" dirty="0" err="1"/>
-              <a:t>của</a:t>
-            </a:r>
-            <a:r>
-              <a:rPr lang="en-US" dirty="0"/>
-              <a:t> </a:t>
-            </a:r>
-            <a:r>
-              <a:rPr lang="en-US" dirty="0" err="1"/>
-              <a:t>nhóm</a:t>
-            </a:r>
-            <a:r>
-              <a:rPr lang="en-US" dirty="0"/>
-              <a:t> ? </a:t>
-            </a:r>
-          </a:p>
-          <a:p>
-            <a:pPr marL="0" indent="0">
-              <a:buNone/>
-            </a:pPr>
-            <a:r>
-              <a:rPr lang="en-US" dirty="0"/>
-              <a:t>                ~1.5 </a:t>
-            </a:r>
-            <a:r>
-              <a:rPr lang="en-US" dirty="0" err="1"/>
-              <a:t>tháng</a:t>
-            </a:r>
-            <a:r>
-              <a:rPr lang="en-US" dirty="0"/>
-              <a:t> .</a:t>
-            </a:r>
-          </a:p>
-          <a:p>
-            <a:pPr marL="0" indent="0">
-              <a:buNone/>
-            </a:pPr>
-            <a:r>
-              <a:rPr lang="en-US" dirty="0"/>
-              <a:t>               </a:t>
-            </a:r>
           </a:p>
         </p:txBody>
       </p:sp>

</xml_diff>